<commit_message>
fix hình ảnh QLTB
</commit_message>
<xml_diff>
--- a/_BaoCao/Báo cáo Tài sản cố định/Thuyết trình.pptx
+++ b/_BaoCao/Báo cáo Tài sản cố định/Thuyết trình.pptx
@@ -20,12 +20,13 @@
     <p:sldId id="283" r:id="rId14"/>
     <p:sldId id="284" r:id="rId15"/>
     <p:sldId id="285" r:id="rId16"/>
-    <p:sldId id="260" r:id="rId17"/>
+    <p:sldId id="286" r:id="rId17"/>
+    <p:sldId id="260" r:id="rId18"/>
   </p:sldIdLst>
   <p:sldSz cx="9144000" cy="6858000" type="screen4x3"/>
   <p:notesSz cx="6858000" cy="9144000"/>
   <p:custDataLst>
-    <p:tags r:id="rId18"/>
+    <p:tags r:id="rId19"/>
   </p:custDataLst>
   <p:defaultTextStyle>
     <a:defPPr>
@@ -4929,7 +4930,7 @@
             <a:r>
               <a:rPr lang="en-US" sz="3600" dirty="0" smtClean="0">
                 <a:solidFill>
-                  <a:srgbClr val="F5802D"/>
+                  <a:srgbClr val="00B0F0"/>
                 </a:solidFill>
               </a:rPr>
               <a:t>Entity Framework</a:t>
@@ -4951,14 +4952,14 @@
             <a:r>
               <a:rPr lang="en-US" sz="3600" dirty="0" smtClean="0">
                 <a:solidFill>
-                  <a:srgbClr val="FFC000"/>
+                  <a:srgbClr val="00B0F0"/>
                 </a:solidFill>
               </a:rPr>
               <a:t>Bootstrap Framework</a:t>
             </a:r>
             <a:endParaRPr lang="en-US" sz="3600" dirty="0">
               <a:solidFill>
-                <a:srgbClr val="F5802D"/>
+                <a:srgbClr val="00B0F0"/>
               </a:solidFill>
             </a:endParaRPr>
           </a:p>
@@ -6284,7 +6285,7 @@
             <a:r>
               <a:rPr lang="en-US" sz="4000" b="1" dirty="0" smtClean="0">
                 <a:solidFill>
-                  <a:srgbClr val="00B0F0"/>
+                  <a:srgbClr val="92D050"/>
                 </a:solidFill>
                 <a:latin typeface="Segoe UI" panose="020B0502040204020203" pitchFamily="34" charset="0"/>
                 <a:cs typeface="Segoe UI" panose="020B0502040204020203" pitchFamily="34" charset="0"/>
@@ -6293,7 +6294,7 @@
             </a:r>
             <a:endParaRPr lang="en-US" sz="4000" b="1" dirty="0">
               <a:solidFill>
-                <a:srgbClr val="00B0F0"/>
+                <a:srgbClr val="92D050"/>
               </a:solidFill>
               <a:latin typeface="Segoe UI" panose="020B0502040204020203" pitchFamily="34" charset="0"/>
               <a:cs typeface="Segoe UI" panose="020B0502040204020203" pitchFamily="34" charset="0"/>
@@ -6455,7 +6456,7 @@
             <a:r>
               <a:rPr lang="en-US" sz="3600" dirty="0" smtClean="0">
                 <a:solidFill>
-                  <a:srgbClr val="92D050"/>
+                  <a:srgbClr val="00B0F0"/>
                 </a:solidFill>
               </a:rPr>
               <a:t>WinForm .NET</a:t>
@@ -6464,14 +6465,14 @@
           <a:p>
             <a:endParaRPr lang="en-US" sz="3600" dirty="0" smtClean="0">
               <a:solidFill>
-                <a:srgbClr val="92D050"/>
+                <a:srgbClr val="00B0F0"/>
               </a:solidFill>
             </a:endParaRPr>
           </a:p>
           <a:p>
             <a:endParaRPr lang="en-US" sz="3600" dirty="0" smtClean="0">
               <a:solidFill>
-                <a:srgbClr val="92D050"/>
+                <a:srgbClr val="00B0F0"/>
               </a:solidFill>
             </a:endParaRPr>
           </a:p>
@@ -6480,14 +6481,14 @@
             <a:r>
               <a:rPr lang="en-US" sz="3600" dirty="0" smtClean="0">
                 <a:solidFill>
-                  <a:srgbClr val="FFC000"/>
+                  <a:srgbClr val="00B0F0"/>
                 </a:solidFill>
               </a:rPr>
               <a:t>WebASP .NET</a:t>
             </a:r>
             <a:endParaRPr lang="en-US" sz="3600" dirty="0">
               <a:solidFill>
-                <a:srgbClr val="F5802D"/>
+                <a:srgbClr val="00B0F0"/>
               </a:solidFill>
             </a:endParaRPr>
           </a:p>
@@ -7962,7 +7963,7 @@
             <a:r>
               <a:rPr lang="en-US" sz="4000" b="1" dirty="0" smtClean="0">
                 <a:solidFill>
-                  <a:srgbClr val="F3BC1B"/>
+                  <a:srgbClr val="92D050"/>
                 </a:solidFill>
                 <a:latin typeface="Segoe UI" panose="020B0502040204020203" pitchFamily="34" charset="0"/>
                 <a:cs typeface="Segoe UI" panose="020B0502040204020203" pitchFamily="34" charset="0"/>
@@ -7971,7 +7972,7 @@
             </a:r>
             <a:endParaRPr lang="en-US" sz="4000" b="1" dirty="0">
               <a:solidFill>
-                <a:srgbClr val="F3BC1B"/>
+                <a:srgbClr val="92D050"/>
               </a:solidFill>
               <a:latin typeface="Segoe UI" panose="020B0502040204020203" pitchFamily="34" charset="0"/>
               <a:cs typeface="Segoe UI" panose="020B0502040204020203" pitchFamily="34" charset="0"/>
@@ -8133,7 +8134,7 @@
             <a:r>
               <a:rPr lang="en-US" sz="3600" dirty="0" smtClean="0">
                 <a:solidFill>
-                  <a:srgbClr val="92D050"/>
+                  <a:srgbClr val="00B0F0"/>
                 </a:solidFill>
               </a:rPr>
               <a:t>Devexpress WinForm</a:t>
@@ -8155,7 +8156,7 @@
             <a:r>
               <a:rPr lang="en-US" sz="3600" dirty="0">
                 <a:solidFill>
-                  <a:srgbClr val="F5802D"/>
+                  <a:srgbClr val="00B0F0"/>
                 </a:solidFill>
               </a:rPr>
               <a:t>Devexpress </a:t>
@@ -8163,14 +8164,14 @@
             <a:r>
               <a:rPr lang="en-US" sz="3600" dirty="0" smtClean="0">
                 <a:solidFill>
-                  <a:srgbClr val="F5802D"/>
+                  <a:srgbClr val="00B0F0"/>
                 </a:solidFill>
               </a:rPr>
               <a:t>WebASP</a:t>
             </a:r>
             <a:endParaRPr lang="en-US" sz="3600" dirty="0">
               <a:solidFill>
-                <a:srgbClr val="F5802D"/>
+                <a:srgbClr val="00B0F0"/>
               </a:solidFill>
             </a:endParaRPr>
           </a:p>
@@ -11160,7 +11161,7 @@
           <a:p>
             <a:endParaRPr lang="en-US" sz="3600" dirty="0" smtClean="0">
               <a:solidFill>
-                <a:srgbClr val="92D050"/>
+                <a:srgbClr val="00B0F0"/>
               </a:solidFill>
             </a:endParaRPr>
           </a:p>
@@ -11169,14 +11170,14 @@
             <a:r>
               <a:rPr lang="en-US" sz="3600" dirty="0" smtClean="0">
                 <a:solidFill>
-                  <a:srgbClr val="FFC000"/>
+                  <a:srgbClr val="00B0F0"/>
                 </a:solidFill>
               </a:rPr>
               <a:t>Mô hình phân lớp</a:t>
             </a:r>
             <a:endParaRPr lang="en-US" sz="3600" dirty="0">
               <a:solidFill>
-                <a:srgbClr val="F5802D"/>
+                <a:srgbClr val="00B0F0"/>
               </a:solidFill>
             </a:endParaRPr>
           </a:p>
@@ -12612,7 +12613,7 @@
             <a:r>
               <a:rPr lang="en-US" sz="3600" dirty="0" smtClean="0">
                 <a:solidFill>
-                  <a:srgbClr val="FFC000"/>
+                  <a:srgbClr val="00B0F0"/>
                 </a:solidFill>
               </a:rPr>
               <a:t>Ứng dụng desktop</a:t>
@@ -12623,7 +12624,7 @@
             <a:r>
               <a:rPr lang="en-US" sz="3600" dirty="0" smtClean="0">
                 <a:solidFill>
-                  <a:srgbClr val="92D050"/>
+                  <a:srgbClr val="00B0F0"/>
                 </a:solidFill>
               </a:rPr>
               <a:t>Ứng dụng website</a:t>
@@ -12634,14 +12635,14 @@
             <a:r>
               <a:rPr lang="en-US" sz="3600" dirty="0" smtClean="0">
                 <a:solidFill>
-                  <a:srgbClr val="F5802D"/>
+                  <a:srgbClr val="00B0F0"/>
                 </a:solidFill>
               </a:rPr>
               <a:t>Ứng dụng web mobile</a:t>
             </a:r>
             <a:endParaRPr lang="en-US" sz="3600" dirty="0">
               <a:solidFill>
-                <a:srgbClr val="00B050"/>
+                <a:srgbClr val="00B0F0"/>
               </a:solidFill>
             </a:endParaRPr>
           </a:p>
@@ -13470,6 +13471,1229 @@
       </p:sp>
       <p:sp>
         <p:nvSpPr>
+          <p:cNvPr id="10" name="Rounded Rectangle 9">
+            <a:hlinkClick r:id="rId2" action="ppaction://hlinksldjump"/>
+          </p:cNvPr>
+          <p:cNvSpPr/>
+          <p:nvPr/>
+        </p:nvSpPr>
+        <p:spPr>
+          <a:xfrm>
+            <a:off x="218440" y="2232958"/>
+            <a:ext cx="1762760" cy="762000"/>
+          </a:xfrm>
+          <a:prstGeom prst="roundRect">
+            <a:avLst>
+              <a:gd name="adj" fmla="val 9167"/>
+            </a:avLst>
+          </a:prstGeom>
+          <a:gradFill>
+            <a:gsLst>
+              <a:gs pos="17000">
+                <a:srgbClr val="3C8FED"/>
+              </a:gs>
+              <a:gs pos="70000">
+                <a:srgbClr val="8EC9FB"/>
+              </a:gs>
+            </a:gsLst>
+            <a:lin ang="16200000" scaled="0"/>
+          </a:gradFill>
+          <a:ln>
+            <a:noFill/>
+          </a:ln>
+          <a:effectLst>
+            <a:outerShdw blurRad="107950" dist="12700" dir="5400000" algn="ctr">
+              <a:srgbClr val="000000"/>
+            </a:outerShdw>
+          </a:effectLst>
+          <a:scene3d>
+            <a:camera prst="orthographicFront">
+              <a:rot lat="0" lon="0" rev="0"/>
+            </a:camera>
+            <a:lightRig rig="soft" dir="t">
+              <a:rot lat="0" lon="0" rev="0"/>
+            </a:lightRig>
+          </a:scene3d>
+          <a:sp3d contourW="44450" prstMaterial="matte">
+            <a:bevelT w="63500" h="63500" prst="artDeco"/>
+            <a:contourClr>
+              <a:srgbClr val="FFFFFF"/>
+            </a:contourClr>
+          </a:sp3d>
+        </p:spPr>
+        <p:style>
+          <a:lnRef idx="2">
+            <a:schemeClr val="accent1">
+              <a:shade val="50000"/>
+            </a:schemeClr>
+          </a:lnRef>
+          <a:fillRef idx="1">
+            <a:schemeClr val="accent1"/>
+          </a:fillRef>
+          <a:effectRef idx="0">
+            <a:schemeClr val="accent1"/>
+          </a:effectRef>
+          <a:fontRef idx="minor">
+            <a:schemeClr val="lt1"/>
+          </a:fontRef>
+        </p:style>
+        <p:txBody>
+          <a:bodyPr rtlCol="0" anchor="ctr"/>
+          <a:lstStyle/>
+          <a:p>
+            <a:r>
+              <a:rPr lang="en-US" sz="2400" b="1" dirty="0" smtClean="0">
+                <a:latin typeface="Segoe UI" panose="020B0502040204020203" pitchFamily="34" charset="0"/>
+                <a:cs typeface="Segoe UI" panose="020B0502040204020203" pitchFamily="34" charset="0"/>
+              </a:rPr>
+              <a:t>Sự ra đời</a:t>
+            </a:r>
+            <a:endParaRPr lang="en-US" sz="2400" b="1" dirty="0">
+              <a:latin typeface="Segoe UI" panose="020B0502040204020203" pitchFamily="34" charset="0"/>
+              <a:cs typeface="Segoe UI" panose="020B0502040204020203" pitchFamily="34" charset="0"/>
+            </a:endParaRPr>
+          </a:p>
+        </p:txBody>
+      </p:sp>
+      <p:sp>
+        <p:nvSpPr>
+          <p:cNvPr id="11" name="Rounded Rectangle 10">
+            <a:hlinkClick r:id="rId3" action="ppaction://hlinksldjump"/>
+          </p:cNvPr>
+          <p:cNvSpPr/>
+          <p:nvPr/>
+        </p:nvSpPr>
+        <p:spPr>
+          <a:xfrm>
+            <a:off x="218440" y="3012639"/>
+            <a:ext cx="1838960" cy="762000"/>
+          </a:xfrm>
+          <a:prstGeom prst="roundRect">
+            <a:avLst>
+              <a:gd name="adj" fmla="val 9167"/>
+            </a:avLst>
+          </a:prstGeom>
+          <a:gradFill>
+            <a:gsLst>
+              <a:gs pos="17000">
+                <a:srgbClr val="3C8FED"/>
+              </a:gs>
+              <a:gs pos="70000">
+                <a:srgbClr val="8EC9FB"/>
+              </a:gs>
+            </a:gsLst>
+            <a:lin ang="16200000" scaled="0"/>
+          </a:gradFill>
+          <a:ln>
+            <a:noFill/>
+          </a:ln>
+          <a:effectLst>
+            <a:outerShdw blurRad="107950" dist="12700" dir="5400000" algn="ctr">
+              <a:srgbClr val="000000"/>
+            </a:outerShdw>
+          </a:effectLst>
+          <a:scene3d>
+            <a:camera prst="orthographicFront">
+              <a:rot lat="0" lon="0" rev="0"/>
+            </a:camera>
+            <a:lightRig rig="soft" dir="t">
+              <a:rot lat="0" lon="0" rev="0"/>
+            </a:lightRig>
+          </a:scene3d>
+          <a:sp3d contourW="44450" prstMaterial="matte">
+            <a:bevelT w="63500" h="63500" prst="artDeco"/>
+            <a:contourClr>
+              <a:srgbClr val="FFFFFF"/>
+            </a:contourClr>
+          </a:sp3d>
+        </p:spPr>
+        <p:style>
+          <a:lnRef idx="2">
+            <a:schemeClr val="accent1">
+              <a:shade val="50000"/>
+            </a:schemeClr>
+          </a:lnRef>
+          <a:fillRef idx="1">
+            <a:schemeClr val="accent1"/>
+          </a:fillRef>
+          <a:effectRef idx="0">
+            <a:schemeClr val="accent1"/>
+          </a:effectRef>
+          <a:fontRef idx="minor">
+            <a:schemeClr val="lt1"/>
+          </a:fontRef>
+        </p:style>
+        <p:txBody>
+          <a:bodyPr rtlCol="0" anchor="ctr"/>
+          <a:lstStyle/>
+          <a:p>
+            <a:r>
+              <a:rPr lang="en-US" sz="2400" b="1" dirty="0" smtClean="0">
+                <a:latin typeface="Segoe UI" panose="020B0502040204020203" pitchFamily="34" charset="0"/>
+                <a:cs typeface="Segoe UI" panose="020B0502040204020203" pitchFamily="34" charset="0"/>
+              </a:rPr>
+              <a:t>Chức năng</a:t>
+            </a:r>
+            <a:endParaRPr lang="en-US" sz="2400" b="1" dirty="0">
+              <a:latin typeface="Segoe UI" panose="020B0502040204020203" pitchFamily="34" charset="0"/>
+              <a:cs typeface="Segoe UI" panose="020B0502040204020203" pitchFamily="34" charset="0"/>
+            </a:endParaRPr>
+          </a:p>
+        </p:txBody>
+      </p:sp>
+      <p:sp>
+        <p:nvSpPr>
+          <p:cNvPr id="13" name="Rounded Rectangle 12">
+            <a:hlinkClick r:id="rId4" action="ppaction://hlinksldjump"/>
+          </p:cNvPr>
+          <p:cNvSpPr/>
+          <p:nvPr/>
+        </p:nvSpPr>
+        <p:spPr>
+          <a:xfrm>
+            <a:off x="218440" y="3792320"/>
+            <a:ext cx="1838960" cy="762000"/>
+          </a:xfrm>
+          <a:prstGeom prst="roundRect">
+            <a:avLst>
+              <a:gd name="adj" fmla="val 9167"/>
+            </a:avLst>
+          </a:prstGeom>
+          <a:gradFill>
+            <a:gsLst>
+              <a:gs pos="17000">
+                <a:srgbClr val="3C8FED"/>
+              </a:gs>
+              <a:gs pos="70000">
+                <a:srgbClr val="8EC9FB"/>
+              </a:gs>
+            </a:gsLst>
+            <a:lin ang="16200000" scaled="0"/>
+          </a:gradFill>
+          <a:ln>
+            <a:noFill/>
+          </a:ln>
+          <a:effectLst>
+            <a:outerShdw blurRad="107950" dist="12700" dir="5400000" algn="ctr">
+              <a:srgbClr val="000000"/>
+            </a:outerShdw>
+          </a:effectLst>
+          <a:scene3d>
+            <a:camera prst="orthographicFront">
+              <a:rot lat="0" lon="0" rev="0"/>
+            </a:camera>
+            <a:lightRig rig="soft" dir="t">
+              <a:rot lat="0" lon="0" rev="0"/>
+            </a:lightRig>
+          </a:scene3d>
+          <a:sp3d contourW="44450" prstMaterial="matte">
+            <a:bevelT w="63500" h="63500" prst="artDeco"/>
+            <a:contourClr>
+              <a:srgbClr val="FFFFFF"/>
+            </a:contourClr>
+          </a:sp3d>
+        </p:spPr>
+        <p:style>
+          <a:lnRef idx="2">
+            <a:schemeClr val="accent1">
+              <a:shade val="50000"/>
+            </a:schemeClr>
+          </a:lnRef>
+          <a:fillRef idx="1">
+            <a:schemeClr val="accent1"/>
+          </a:fillRef>
+          <a:effectRef idx="0">
+            <a:schemeClr val="accent1"/>
+          </a:effectRef>
+          <a:fontRef idx="minor">
+            <a:schemeClr val="lt1"/>
+          </a:fontRef>
+        </p:style>
+        <p:txBody>
+          <a:bodyPr rtlCol="0" anchor="ctr"/>
+          <a:lstStyle/>
+          <a:p>
+            <a:r>
+              <a:rPr lang="en-US" sz="2400" b="1" dirty="0" smtClean="0">
+                <a:latin typeface="Segoe UI" panose="020B0502040204020203" pitchFamily="34" charset="0"/>
+                <a:cs typeface="Segoe UI" panose="020B0502040204020203" pitchFamily="34" charset="0"/>
+              </a:rPr>
+              <a:t>Công nghệ</a:t>
+            </a:r>
+            <a:endParaRPr lang="en-US" sz="2400" b="1" dirty="0">
+              <a:latin typeface="Segoe UI" panose="020B0502040204020203" pitchFamily="34" charset="0"/>
+              <a:cs typeface="Segoe UI" panose="020B0502040204020203" pitchFamily="34" charset="0"/>
+            </a:endParaRPr>
+          </a:p>
+        </p:txBody>
+      </p:sp>
+      <p:sp>
+        <p:nvSpPr>
+          <p:cNvPr id="5" name="Rounded Rectangle 4">
+            <a:hlinkClick r:id="rId5" action="ppaction://hlinksldjump"/>
+          </p:cNvPr>
+          <p:cNvSpPr/>
+          <p:nvPr/>
+        </p:nvSpPr>
+        <p:spPr>
+          <a:xfrm>
+            <a:off x="218440" y="1453277"/>
+            <a:ext cx="1838960" cy="762000"/>
+          </a:xfrm>
+          <a:prstGeom prst="roundRect">
+            <a:avLst>
+              <a:gd name="adj" fmla="val 9167"/>
+            </a:avLst>
+          </a:prstGeom>
+          <a:gradFill>
+            <a:gsLst>
+              <a:gs pos="17000">
+                <a:srgbClr val="3C8FED"/>
+              </a:gs>
+              <a:gs pos="70000">
+                <a:srgbClr val="8EC9FB"/>
+              </a:gs>
+            </a:gsLst>
+            <a:lin ang="16200000" scaled="0"/>
+          </a:gradFill>
+          <a:ln>
+            <a:noFill/>
+          </a:ln>
+          <a:effectLst>
+            <a:outerShdw blurRad="107950" dist="12700" dir="5400000" algn="ctr">
+              <a:srgbClr val="000000"/>
+            </a:outerShdw>
+          </a:effectLst>
+          <a:scene3d>
+            <a:camera prst="orthographicFront">
+              <a:rot lat="0" lon="0" rev="0"/>
+            </a:camera>
+            <a:lightRig rig="soft" dir="t">
+              <a:rot lat="0" lon="0" rev="0"/>
+            </a:lightRig>
+          </a:scene3d>
+          <a:sp3d contourW="44450" prstMaterial="matte">
+            <a:bevelT w="63500" h="63500" prst="artDeco"/>
+            <a:contourClr>
+              <a:srgbClr val="FFFFFF"/>
+            </a:contourClr>
+          </a:sp3d>
+        </p:spPr>
+        <p:style>
+          <a:lnRef idx="2">
+            <a:schemeClr val="accent1">
+              <a:shade val="50000"/>
+            </a:schemeClr>
+          </a:lnRef>
+          <a:fillRef idx="1">
+            <a:schemeClr val="accent1"/>
+          </a:fillRef>
+          <a:effectRef idx="0">
+            <a:schemeClr val="accent1"/>
+          </a:effectRef>
+          <a:fontRef idx="minor">
+            <a:schemeClr val="lt1"/>
+          </a:fontRef>
+        </p:style>
+        <p:txBody>
+          <a:bodyPr rtlCol="0" anchor="ctr"/>
+          <a:lstStyle/>
+          <a:p>
+            <a:r>
+              <a:rPr lang="en-US" sz="2400" b="1" dirty="0" smtClean="0">
+                <a:latin typeface="Segoe UI" panose="020B0502040204020203" pitchFamily="34" charset="0"/>
+                <a:cs typeface="Segoe UI" panose="020B0502040204020203" pitchFamily="34" charset="0"/>
+              </a:rPr>
+              <a:t>Nội dung</a:t>
+            </a:r>
+            <a:endParaRPr lang="en-US" sz="2400" b="1" dirty="0">
+              <a:latin typeface="Segoe UI" panose="020B0502040204020203" pitchFamily="34" charset="0"/>
+              <a:cs typeface="Segoe UI" panose="020B0502040204020203" pitchFamily="34" charset="0"/>
+            </a:endParaRPr>
+          </a:p>
+        </p:txBody>
+      </p:sp>
+      <p:sp>
+        <p:nvSpPr>
+          <p:cNvPr id="14" name="Rounded Rectangle 13"/>
+          <p:cNvSpPr/>
+          <p:nvPr/>
+        </p:nvSpPr>
+        <p:spPr>
+          <a:xfrm>
+            <a:off x="218440" y="4572000"/>
+            <a:ext cx="1838960" cy="762000"/>
+          </a:xfrm>
+          <a:prstGeom prst="roundRect">
+            <a:avLst>
+              <a:gd name="adj" fmla="val 9167"/>
+            </a:avLst>
+          </a:prstGeom>
+          <a:gradFill>
+            <a:gsLst>
+              <a:gs pos="17000">
+                <a:srgbClr val="3C8FED"/>
+              </a:gs>
+              <a:gs pos="70000">
+                <a:srgbClr val="8EC9FB"/>
+              </a:gs>
+            </a:gsLst>
+            <a:lin ang="16200000" scaled="0"/>
+          </a:gradFill>
+          <a:ln>
+            <a:noFill/>
+          </a:ln>
+          <a:effectLst>
+            <a:outerShdw blurRad="107950" dist="12700" dir="5400000" algn="ctr">
+              <a:srgbClr val="000000"/>
+            </a:outerShdw>
+          </a:effectLst>
+          <a:scene3d>
+            <a:camera prst="orthographicFront">
+              <a:rot lat="0" lon="0" rev="0"/>
+            </a:camera>
+            <a:lightRig rig="soft" dir="t">
+              <a:rot lat="0" lon="0" rev="0"/>
+            </a:lightRig>
+          </a:scene3d>
+          <a:sp3d contourW="44450" prstMaterial="matte">
+            <a:bevelT w="63500" h="63500" prst="artDeco"/>
+            <a:contourClr>
+              <a:srgbClr val="FFFFFF"/>
+            </a:contourClr>
+          </a:sp3d>
+        </p:spPr>
+        <p:style>
+          <a:lnRef idx="2">
+            <a:schemeClr val="accent1">
+              <a:shade val="50000"/>
+            </a:schemeClr>
+          </a:lnRef>
+          <a:fillRef idx="1">
+            <a:schemeClr val="accent1"/>
+          </a:fillRef>
+          <a:effectRef idx="0">
+            <a:schemeClr val="accent1"/>
+          </a:effectRef>
+          <a:fontRef idx="minor">
+            <a:schemeClr val="lt1"/>
+          </a:fontRef>
+        </p:style>
+        <p:txBody>
+          <a:bodyPr rtlCol="0" anchor="ctr"/>
+          <a:lstStyle/>
+          <a:p>
+            <a:r>
+              <a:rPr lang="en-US" sz="2400" b="1" dirty="0" smtClean="0">
+                <a:latin typeface="Segoe UI" panose="020B0502040204020203" pitchFamily="34" charset="0"/>
+                <a:cs typeface="Segoe UI" panose="020B0502040204020203" pitchFamily="34" charset="0"/>
+              </a:rPr>
+              <a:t>Chạy thử</a:t>
+            </a:r>
+            <a:endParaRPr lang="en-US" sz="2400" b="1" dirty="0">
+              <a:latin typeface="Segoe UI" panose="020B0502040204020203" pitchFamily="34" charset="0"/>
+              <a:cs typeface="Segoe UI" panose="020B0502040204020203" pitchFamily="34" charset="0"/>
+            </a:endParaRPr>
+          </a:p>
+        </p:txBody>
+      </p:sp>
+      <p:sp>
+        <p:nvSpPr>
+          <p:cNvPr id="6" name="Rounded Rectangle 5"/>
+          <p:cNvSpPr/>
+          <p:nvPr/>
+        </p:nvSpPr>
+        <p:spPr>
+          <a:xfrm>
+            <a:off x="2057400" y="1255643"/>
+            <a:ext cx="6487160" cy="4230757"/>
+          </a:xfrm>
+          <a:prstGeom prst="roundRect">
+            <a:avLst>
+              <a:gd name="adj" fmla="val 1226"/>
+            </a:avLst>
+          </a:prstGeom>
+          <a:solidFill>
+            <a:schemeClr val="bg1"/>
+          </a:solidFill>
+          <a:ln w="76200">
+            <a:solidFill>
+              <a:srgbClr val="BDD8F3"/>
+            </a:solidFill>
+          </a:ln>
+          <a:effectLst>
+            <a:outerShdw blurRad="50800" dist="38100" dir="10800000" algn="r" rotWithShape="0">
+              <a:prstClr val="black">
+                <a:alpha val="40000"/>
+              </a:prstClr>
+            </a:outerShdw>
+            <a:reflection blurRad="6350" stA="52000" endA="300" endPos="35000" dir="5400000" sy="-100000" algn="bl" rotWithShape="0"/>
+          </a:effectLst>
+          <a:scene3d>
+            <a:camera prst="perspectiveContrastingRightFacing">
+              <a:rot lat="170509" lon="20736677" rev="117141"/>
+            </a:camera>
+            <a:lightRig rig="threePt" dir="t"/>
+          </a:scene3d>
+        </p:spPr>
+        <p:style>
+          <a:lnRef idx="2">
+            <a:schemeClr val="accent1">
+              <a:shade val="50000"/>
+            </a:schemeClr>
+          </a:lnRef>
+          <a:fillRef idx="1">
+            <a:schemeClr val="accent1"/>
+          </a:fillRef>
+          <a:effectRef idx="0">
+            <a:schemeClr val="accent1"/>
+          </a:effectRef>
+          <a:fontRef idx="minor">
+            <a:schemeClr val="lt1"/>
+          </a:fontRef>
+        </p:style>
+        <p:txBody>
+          <a:bodyPr rtlCol="0" anchor="ctr"/>
+          <a:lstStyle/>
+          <a:p>
+            <a:pPr algn="ctr"/>
+            <a:endParaRPr lang="en-US" dirty="0"/>
+          </a:p>
+        </p:txBody>
+      </p:sp>
+      <p:sp>
+        <p:nvSpPr>
+          <p:cNvPr id="7" name="TextBox 6"/>
+          <p:cNvSpPr txBox="1"/>
+          <p:nvPr/>
+        </p:nvSpPr>
+        <p:spPr>
+          <a:xfrm>
+            <a:off x="609600" y="206514"/>
+            <a:ext cx="7984878" cy="677108"/>
+          </a:xfrm>
+          <a:prstGeom prst="rect">
+            <a:avLst/>
+          </a:prstGeom>
+          <a:noFill/>
+        </p:spPr>
+        <p:txBody>
+          <a:bodyPr wrap="none" rtlCol="0">
+            <a:spAutoFit/>
+          </a:bodyPr>
+          <a:lstStyle/>
+          <a:p>
+            <a:r>
+              <a:rPr lang="en-US" sz="3800" b="1" dirty="0" smtClean="0">
+                <a:solidFill>
+                  <a:schemeClr val="bg1"/>
+                </a:solidFill>
+                <a:latin typeface="Segoe UI" panose="020B0502040204020203" pitchFamily="34" charset="0"/>
+                <a:cs typeface="Segoe UI" panose="020B0502040204020203" pitchFamily="34" charset="0"/>
+              </a:rPr>
+              <a:t>Phần mềm Quản lý tài sản cố định</a:t>
+            </a:r>
+            <a:endParaRPr lang="en-US" sz="3800" b="1" dirty="0">
+              <a:solidFill>
+                <a:schemeClr val="bg1"/>
+              </a:solidFill>
+              <a:latin typeface="Segoe UI" panose="020B0502040204020203" pitchFamily="34" charset="0"/>
+              <a:cs typeface="Segoe UI" panose="020B0502040204020203" pitchFamily="34" charset="0"/>
+            </a:endParaRPr>
+          </a:p>
+        </p:txBody>
+      </p:sp>
+      <p:sp>
+        <p:nvSpPr>
+          <p:cNvPr id="8" name="TextBox 7"/>
+          <p:cNvSpPr txBox="1"/>
+          <p:nvPr/>
+        </p:nvSpPr>
+        <p:spPr>
+          <a:xfrm>
+            <a:off x="1934401" y="1197114"/>
+            <a:ext cx="6828599" cy="707886"/>
+          </a:xfrm>
+          <a:prstGeom prst="rect">
+            <a:avLst/>
+          </a:prstGeom>
+          <a:noFill/>
+        </p:spPr>
+        <p:txBody>
+          <a:bodyPr wrap="square" rtlCol="0">
+            <a:spAutoFit/>
+          </a:bodyPr>
+          <a:lstStyle/>
+          <a:p>
+            <a:r>
+              <a:rPr lang="en-US" sz="4000" b="1" dirty="0" smtClean="0">
+                <a:solidFill>
+                  <a:srgbClr val="3C8FED"/>
+                </a:solidFill>
+                <a:latin typeface="Segoe UI" panose="020B0502040204020203" pitchFamily="34" charset="0"/>
+                <a:cs typeface="Segoe UI" panose="020B0502040204020203" pitchFamily="34" charset="0"/>
+              </a:rPr>
+              <a:t>Ứng dụng desktop</a:t>
+            </a:r>
+            <a:endParaRPr lang="en-US" sz="4000" b="1" dirty="0">
+              <a:solidFill>
+                <a:srgbClr val="3C8FED"/>
+              </a:solidFill>
+              <a:latin typeface="Segoe UI" panose="020B0502040204020203" pitchFamily="34" charset="0"/>
+              <a:cs typeface="Segoe UI" panose="020B0502040204020203" pitchFamily="34" charset="0"/>
+            </a:endParaRPr>
+          </a:p>
+        </p:txBody>
+      </p:sp>
+      <p:sp>
+        <p:nvSpPr>
+          <p:cNvPr id="9" name="TextBox 8"/>
+          <p:cNvSpPr txBox="1"/>
+          <p:nvPr/>
+        </p:nvSpPr>
+        <p:spPr>
+          <a:xfrm>
+            <a:off x="1981200" y="2339876"/>
+            <a:ext cx="6248400" cy="2308324"/>
+          </a:xfrm>
+          <a:prstGeom prst="rect">
+            <a:avLst/>
+          </a:prstGeom>
+          <a:noFill/>
+        </p:spPr>
+        <p:txBody>
+          <a:bodyPr wrap="square" rtlCol="0">
+            <a:spAutoFit/>
+          </a:bodyPr>
+          <a:lstStyle/>
+          <a:p>
+            <a:r>
+              <a:rPr lang="en-US" sz="3600" dirty="0" smtClean="0">
+                <a:solidFill>
+                  <a:srgbClr val="00B0F0"/>
+                </a:solidFill>
+              </a:rPr>
+              <a:t>Xem danh sách tài sản của khoa Công nghệ thông tin. Tìm kiếm tài sản thuộc sở hữu của thầy Thanh.</a:t>
+            </a:r>
+            <a:endParaRPr lang="en-US" sz="3600" dirty="0">
+              <a:solidFill>
+                <a:srgbClr val="00B0F0"/>
+              </a:solidFill>
+            </a:endParaRPr>
+          </a:p>
+        </p:txBody>
+      </p:sp>
+      <p:sp>
+        <p:nvSpPr>
+          <p:cNvPr id="15" name="Rounded Rectangle 14"/>
+          <p:cNvSpPr/>
+          <p:nvPr/>
+        </p:nvSpPr>
+        <p:spPr>
+          <a:xfrm>
+            <a:off x="228600" y="4554320"/>
+            <a:ext cx="1828800" cy="779680"/>
+          </a:xfrm>
+          <a:prstGeom prst="roundRect">
+            <a:avLst>
+              <a:gd name="adj" fmla="val 4430"/>
+            </a:avLst>
+          </a:prstGeom>
+          <a:gradFill>
+            <a:gsLst>
+              <a:gs pos="17000">
+                <a:srgbClr val="F5802D"/>
+              </a:gs>
+              <a:gs pos="70000">
+                <a:srgbClr val="F3BC1B"/>
+              </a:gs>
+            </a:gsLst>
+            <a:lin ang="16200000" scaled="0"/>
+          </a:gradFill>
+          <a:ln>
+            <a:solidFill>
+              <a:srgbClr val="BDD8F3"/>
+            </a:solidFill>
+          </a:ln>
+          <a:effectLst>
+            <a:outerShdw blurRad="107950" dist="12700" dir="5400000" algn="ctr">
+              <a:srgbClr val="000000"/>
+            </a:outerShdw>
+          </a:effectLst>
+          <a:scene3d>
+            <a:camera prst="orthographicFront">
+              <a:rot lat="0" lon="0" rev="0"/>
+            </a:camera>
+            <a:lightRig rig="soft" dir="t">
+              <a:rot lat="0" lon="0" rev="0"/>
+            </a:lightRig>
+          </a:scene3d>
+          <a:sp3d contourW="44450" prstMaterial="matte">
+            <a:bevelT w="63500" h="63500" prst="artDeco"/>
+            <a:contourClr>
+              <a:srgbClr val="3C8FED"/>
+            </a:contourClr>
+          </a:sp3d>
+        </p:spPr>
+        <p:style>
+          <a:lnRef idx="2">
+            <a:schemeClr val="accent1">
+              <a:shade val="50000"/>
+            </a:schemeClr>
+          </a:lnRef>
+          <a:fillRef idx="1">
+            <a:schemeClr val="accent1"/>
+          </a:fillRef>
+          <a:effectRef idx="0">
+            <a:schemeClr val="accent1"/>
+          </a:effectRef>
+          <a:fontRef idx="minor">
+            <a:schemeClr val="lt1"/>
+          </a:fontRef>
+        </p:style>
+        <p:txBody>
+          <a:bodyPr rtlCol="0" anchor="ctr"/>
+          <a:lstStyle/>
+          <a:p>
+            <a:r>
+              <a:rPr lang="en-US" sz="2400" b="1" dirty="0" smtClean="0">
+                <a:solidFill>
+                  <a:schemeClr val="bg1"/>
+                </a:solidFill>
+                <a:latin typeface="Segoe UI" panose="020B0502040204020203" pitchFamily="34" charset="0"/>
+                <a:cs typeface="Segoe UI" panose="020B0502040204020203" pitchFamily="34" charset="0"/>
+              </a:rPr>
+              <a:t>Chạy thử</a:t>
+            </a:r>
+            <a:endParaRPr lang="en-US" sz="2400" b="1" dirty="0">
+              <a:solidFill>
+                <a:schemeClr val="bg1"/>
+              </a:solidFill>
+              <a:latin typeface="Segoe UI" panose="020B0502040204020203" pitchFamily="34" charset="0"/>
+              <a:cs typeface="Segoe UI" panose="020B0502040204020203" pitchFamily="34" charset="0"/>
+            </a:endParaRPr>
+          </a:p>
+        </p:txBody>
+      </p:sp>
+      <p:sp>
+        <p:nvSpPr>
+          <p:cNvPr id="16" name="Right Arrow 15">
+            <a:hlinkClick r:id="" action="ppaction://hlinkshowjump?jump=nextslide"/>
+          </p:cNvPr>
+          <p:cNvSpPr/>
+          <p:nvPr/>
+        </p:nvSpPr>
+        <p:spPr>
+          <a:xfrm>
+            <a:off x="7500544" y="5486400"/>
+            <a:ext cx="838200" cy="838200"/>
+          </a:xfrm>
+          <a:prstGeom prst="rightArrow">
+            <a:avLst/>
+          </a:prstGeom>
+          <a:gradFill>
+            <a:gsLst>
+              <a:gs pos="39000">
+                <a:srgbClr val="EF9747"/>
+              </a:gs>
+              <a:gs pos="87000">
+                <a:srgbClr val="FFC000">
+                  <a:alpha val="10000"/>
+                </a:srgbClr>
+              </a:gs>
+            </a:gsLst>
+            <a:lin ang="10800000" scaled="0"/>
+          </a:gradFill>
+          <a:ln>
+            <a:noFill/>
+          </a:ln>
+        </p:spPr>
+        <p:style>
+          <a:lnRef idx="2">
+            <a:schemeClr val="accent1">
+              <a:shade val="50000"/>
+            </a:schemeClr>
+          </a:lnRef>
+          <a:fillRef idx="1">
+            <a:schemeClr val="accent1"/>
+          </a:fillRef>
+          <a:effectRef idx="0">
+            <a:schemeClr val="accent1"/>
+          </a:effectRef>
+          <a:fontRef idx="minor">
+            <a:schemeClr val="lt1"/>
+          </a:fontRef>
+        </p:style>
+        <p:txBody>
+          <a:bodyPr rtlCol="0" anchor="ctr"/>
+          <a:lstStyle/>
+          <a:p>
+            <a:pPr algn="ctr"/>
+            <a:endParaRPr lang="en-US"/>
+          </a:p>
+        </p:txBody>
+      </p:sp>
+    </p:spTree>
+    <p:extLst>
+      <p:ext uri="{BB962C8B-B14F-4D97-AF65-F5344CB8AC3E}">
+        <p14:creationId xmlns:p14="http://schemas.microsoft.com/office/powerpoint/2010/main" val="1978979473"/>
+      </p:ext>
+    </p:extLst>
+  </p:cSld>
+  <p:clrMapOvr>
+    <a:masterClrMapping/>
+  </p:clrMapOvr>
+  <mc:AlternateContent xmlns:mc="http://schemas.openxmlformats.org/markup-compatibility/2006">
+    <mc:Choice xmlns:p15="http://schemas.microsoft.com/office/powerpoint/2012/main" Requires="p15">
+      <p:transition xmlns:p14="http://schemas.microsoft.com/office/powerpoint/2010/main" spd="slow" p14:dur="1250" advClick="0">
+        <p15:prstTrans prst="pageCurlDouble"/>
+      </p:transition>
+    </mc:Choice>
+    <mc:Fallback>
+      <p:transition spd="slow" advClick="0">
+        <p:fade/>
+      </p:transition>
+    </mc:Fallback>
+  </mc:AlternateContent>
+  <p:timing>
+    <p:tnLst>
+      <p:par>
+        <p:cTn id="1" dur="indefinite" restart="never" nodeType="tmRoot">
+          <p:childTnLst>
+            <p:seq concurrent="1" nextAc="seek">
+              <p:cTn id="2" dur="indefinite" nodeType="mainSeq">
+                <p:childTnLst>
+                  <p:par>
+                    <p:cTn id="3" fill="hold">
+                      <p:stCondLst>
+                        <p:cond delay="indefinite"/>
+                        <p:cond evt="onBegin" delay="0">
+                          <p:tn val="2"/>
+                        </p:cond>
+                      </p:stCondLst>
+                      <p:childTnLst>
+                        <p:par>
+                          <p:cTn id="4" fill="hold">
+                            <p:stCondLst>
+                              <p:cond delay="0"/>
+                            </p:stCondLst>
+                            <p:childTnLst>
+                              <p:par>
+                                <p:cTn id="5" presetID="42" presetClass="entr" presetSubtype="0" fill="hold" nodeType="afterEffect">
+                                  <p:stCondLst>
+                                    <p:cond delay="0"/>
+                                  </p:stCondLst>
+                                  <p:childTnLst>
+                                    <p:set>
+                                      <p:cBhvr>
+                                        <p:cTn id="6" dur="1" fill="hold">
+                                          <p:stCondLst>
+                                            <p:cond delay="0"/>
+                                          </p:stCondLst>
+                                        </p:cTn>
+                                        <p:tgtEl>
+                                          <p:spTgt spid="7">
+                                            <p:txEl>
+                                              <p:pRg st="0" end="0"/>
+                                            </p:txEl>
+                                          </p:spTgt>
+                                        </p:tgtEl>
+                                        <p:attrNameLst>
+                                          <p:attrName>style.visibility</p:attrName>
+                                        </p:attrNameLst>
+                                      </p:cBhvr>
+                                      <p:to>
+                                        <p:strVal val="visible"/>
+                                      </p:to>
+                                    </p:set>
+                                    <p:animEffect transition="in" filter="fade">
+                                      <p:cBhvr>
+                                        <p:cTn id="7" dur="500"/>
+                                        <p:tgtEl>
+                                          <p:spTgt spid="7">
+                                            <p:txEl>
+                                              <p:pRg st="0" end="0"/>
+                                            </p:txEl>
+                                          </p:spTgt>
+                                        </p:tgtEl>
+                                      </p:cBhvr>
+                                    </p:animEffect>
+                                    <p:anim calcmode="lin" valueType="num">
+                                      <p:cBhvr>
+                                        <p:cTn id="8" dur="500" fill="hold"/>
+                                        <p:tgtEl>
+                                          <p:spTgt spid="7">
+                                            <p:txEl>
+                                              <p:pRg st="0" end="0"/>
+                                            </p:txEl>
+                                          </p:spTgt>
+                                        </p:tgtEl>
+                                        <p:attrNameLst>
+                                          <p:attrName>ppt_x</p:attrName>
+                                        </p:attrNameLst>
+                                      </p:cBhvr>
+                                      <p:tavLst>
+                                        <p:tav tm="0">
+                                          <p:val>
+                                            <p:strVal val="#ppt_x"/>
+                                          </p:val>
+                                        </p:tav>
+                                        <p:tav tm="100000">
+                                          <p:val>
+                                            <p:strVal val="#ppt_x"/>
+                                          </p:val>
+                                        </p:tav>
+                                      </p:tavLst>
+                                    </p:anim>
+                                    <p:anim calcmode="lin" valueType="num">
+                                      <p:cBhvr>
+                                        <p:cTn id="9" dur="500" fill="hold"/>
+                                        <p:tgtEl>
+                                          <p:spTgt spid="7">
+                                            <p:txEl>
+                                              <p:pRg st="0" end="0"/>
+                                            </p:txEl>
+                                          </p:spTgt>
+                                        </p:tgtEl>
+                                        <p:attrNameLst>
+                                          <p:attrName>ppt_y</p:attrName>
+                                        </p:attrNameLst>
+                                      </p:cBhvr>
+                                      <p:tavLst>
+                                        <p:tav tm="0">
+                                          <p:val>
+                                            <p:strVal val="#ppt_y+.1"/>
+                                          </p:val>
+                                        </p:tav>
+                                        <p:tav tm="100000">
+                                          <p:val>
+                                            <p:strVal val="#ppt_y"/>
+                                          </p:val>
+                                        </p:tav>
+                                      </p:tavLst>
+                                    </p:anim>
+                                  </p:childTnLst>
+                                </p:cTn>
+                              </p:par>
+                            </p:childTnLst>
+                          </p:cTn>
+                        </p:par>
+                        <p:par>
+                          <p:cTn id="10" fill="hold">
+                            <p:stCondLst>
+                              <p:cond delay="500"/>
+                            </p:stCondLst>
+                            <p:childTnLst>
+                              <p:par>
+                                <p:cTn id="11" presetID="42" presetClass="entr" presetSubtype="0" fill="hold" nodeType="afterEffect">
+                                  <p:stCondLst>
+                                    <p:cond delay="0"/>
+                                  </p:stCondLst>
+                                  <p:childTnLst>
+                                    <p:set>
+                                      <p:cBhvr>
+                                        <p:cTn id="12" dur="1" fill="hold">
+                                          <p:stCondLst>
+                                            <p:cond delay="0"/>
+                                          </p:stCondLst>
+                                        </p:cTn>
+                                        <p:tgtEl>
+                                          <p:spTgt spid="8">
+                                            <p:txEl>
+                                              <p:pRg st="0" end="0"/>
+                                            </p:txEl>
+                                          </p:spTgt>
+                                        </p:tgtEl>
+                                        <p:attrNameLst>
+                                          <p:attrName>style.visibility</p:attrName>
+                                        </p:attrNameLst>
+                                      </p:cBhvr>
+                                      <p:to>
+                                        <p:strVal val="visible"/>
+                                      </p:to>
+                                    </p:set>
+                                    <p:animEffect transition="in" filter="fade">
+                                      <p:cBhvr>
+                                        <p:cTn id="13" dur="500"/>
+                                        <p:tgtEl>
+                                          <p:spTgt spid="8">
+                                            <p:txEl>
+                                              <p:pRg st="0" end="0"/>
+                                            </p:txEl>
+                                          </p:spTgt>
+                                        </p:tgtEl>
+                                      </p:cBhvr>
+                                    </p:animEffect>
+                                    <p:anim calcmode="lin" valueType="num">
+                                      <p:cBhvr>
+                                        <p:cTn id="14" dur="500" fill="hold"/>
+                                        <p:tgtEl>
+                                          <p:spTgt spid="8">
+                                            <p:txEl>
+                                              <p:pRg st="0" end="0"/>
+                                            </p:txEl>
+                                          </p:spTgt>
+                                        </p:tgtEl>
+                                        <p:attrNameLst>
+                                          <p:attrName>ppt_x</p:attrName>
+                                        </p:attrNameLst>
+                                      </p:cBhvr>
+                                      <p:tavLst>
+                                        <p:tav tm="0">
+                                          <p:val>
+                                            <p:strVal val="#ppt_x"/>
+                                          </p:val>
+                                        </p:tav>
+                                        <p:tav tm="100000">
+                                          <p:val>
+                                            <p:strVal val="#ppt_x"/>
+                                          </p:val>
+                                        </p:tav>
+                                      </p:tavLst>
+                                    </p:anim>
+                                    <p:anim calcmode="lin" valueType="num">
+                                      <p:cBhvr>
+                                        <p:cTn id="15" dur="500" fill="hold"/>
+                                        <p:tgtEl>
+                                          <p:spTgt spid="8">
+                                            <p:txEl>
+                                              <p:pRg st="0" end="0"/>
+                                            </p:txEl>
+                                          </p:spTgt>
+                                        </p:tgtEl>
+                                        <p:attrNameLst>
+                                          <p:attrName>ppt_y</p:attrName>
+                                        </p:attrNameLst>
+                                      </p:cBhvr>
+                                      <p:tavLst>
+                                        <p:tav tm="0">
+                                          <p:val>
+                                            <p:strVal val="#ppt_y+.1"/>
+                                          </p:val>
+                                        </p:tav>
+                                        <p:tav tm="100000">
+                                          <p:val>
+                                            <p:strVal val="#ppt_y"/>
+                                          </p:val>
+                                        </p:tav>
+                                      </p:tavLst>
+                                    </p:anim>
+                                  </p:childTnLst>
+                                </p:cTn>
+                              </p:par>
+                            </p:childTnLst>
+                          </p:cTn>
+                        </p:par>
+                        <p:par>
+                          <p:cTn id="16" fill="hold">
+                            <p:stCondLst>
+                              <p:cond delay="1000"/>
+                            </p:stCondLst>
+                            <p:childTnLst>
+                              <p:par>
+                                <p:cTn id="17" presetID="42" presetClass="entr" presetSubtype="0" fill="hold" nodeType="afterEffect">
+                                  <p:stCondLst>
+                                    <p:cond delay="0"/>
+                                  </p:stCondLst>
+                                  <p:childTnLst>
+                                    <p:set>
+                                      <p:cBhvr>
+                                        <p:cTn id="18" dur="1" fill="hold">
+                                          <p:stCondLst>
+                                            <p:cond delay="0"/>
+                                          </p:stCondLst>
+                                        </p:cTn>
+                                        <p:tgtEl>
+                                          <p:spTgt spid="9">
+                                            <p:txEl>
+                                              <p:pRg st="0" end="0"/>
+                                            </p:txEl>
+                                          </p:spTgt>
+                                        </p:tgtEl>
+                                        <p:attrNameLst>
+                                          <p:attrName>style.visibility</p:attrName>
+                                        </p:attrNameLst>
+                                      </p:cBhvr>
+                                      <p:to>
+                                        <p:strVal val="visible"/>
+                                      </p:to>
+                                    </p:set>
+                                    <p:animEffect transition="in" filter="fade">
+                                      <p:cBhvr>
+                                        <p:cTn id="19" dur="500"/>
+                                        <p:tgtEl>
+                                          <p:spTgt spid="9">
+                                            <p:txEl>
+                                              <p:pRg st="0" end="0"/>
+                                            </p:txEl>
+                                          </p:spTgt>
+                                        </p:tgtEl>
+                                      </p:cBhvr>
+                                    </p:animEffect>
+                                    <p:anim calcmode="lin" valueType="num">
+                                      <p:cBhvr>
+                                        <p:cTn id="20" dur="500" fill="hold"/>
+                                        <p:tgtEl>
+                                          <p:spTgt spid="9">
+                                            <p:txEl>
+                                              <p:pRg st="0" end="0"/>
+                                            </p:txEl>
+                                          </p:spTgt>
+                                        </p:tgtEl>
+                                        <p:attrNameLst>
+                                          <p:attrName>ppt_x</p:attrName>
+                                        </p:attrNameLst>
+                                      </p:cBhvr>
+                                      <p:tavLst>
+                                        <p:tav tm="0">
+                                          <p:val>
+                                            <p:strVal val="#ppt_x"/>
+                                          </p:val>
+                                        </p:tav>
+                                        <p:tav tm="100000">
+                                          <p:val>
+                                            <p:strVal val="#ppt_x"/>
+                                          </p:val>
+                                        </p:tav>
+                                      </p:tavLst>
+                                    </p:anim>
+                                    <p:anim calcmode="lin" valueType="num">
+                                      <p:cBhvr>
+                                        <p:cTn id="21" dur="500" fill="hold"/>
+                                        <p:tgtEl>
+                                          <p:spTgt spid="9">
+                                            <p:txEl>
+                                              <p:pRg st="0" end="0"/>
+                                            </p:txEl>
+                                          </p:spTgt>
+                                        </p:tgtEl>
+                                        <p:attrNameLst>
+                                          <p:attrName>ppt_y</p:attrName>
+                                        </p:attrNameLst>
+                                      </p:cBhvr>
+                                      <p:tavLst>
+                                        <p:tav tm="0">
+                                          <p:val>
+                                            <p:strVal val="#ppt_y+.1"/>
+                                          </p:val>
+                                        </p:tav>
+                                        <p:tav tm="100000">
+                                          <p:val>
+                                            <p:strVal val="#ppt_y"/>
+                                          </p:val>
+                                        </p:tav>
+                                      </p:tavLst>
+                                    </p:anim>
+                                  </p:childTnLst>
+                                </p:cTn>
+                              </p:par>
+                            </p:childTnLst>
+                          </p:cTn>
+                        </p:par>
+                      </p:childTnLst>
+                    </p:cTn>
+                  </p:par>
+                </p:childTnLst>
+              </p:cTn>
+              <p:prevCondLst>
+                <p:cond evt="onPrev" delay="0">
+                  <p:tgtEl>
+                    <p:sldTgt/>
+                  </p:tgtEl>
+                </p:cond>
+              </p:prevCondLst>
+              <p:nextCondLst>
+                <p:cond evt="onNext" delay="0">
+                  <p:tgtEl>
+                    <p:sldTgt/>
+                  </p:tgtEl>
+                </p:cond>
+              </p:nextCondLst>
+            </p:seq>
+          </p:childTnLst>
+        </p:cTn>
+      </p:par>
+    </p:tnLst>
+  </p:timing>
+</p:sld>
+</file>
+
+<file path=ppt/slides/slide17.xml><?xml version="1.0" encoding="utf-8"?>
+<p:sld xmlns:a="http://schemas.openxmlformats.org/drawingml/2006/main" xmlns:r="http://schemas.openxmlformats.org/officeDocument/2006/relationships" xmlns:p="http://schemas.openxmlformats.org/presentationml/2006/main">
+  <p:cSld>
+    <p:spTree>
+      <p:nvGrpSpPr>
+        <p:cNvPr id="1" name=""/>
+        <p:cNvGrpSpPr/>
+        <p:nvPr/>
+      </p:nvGrpSpPr>
+      <p:grpSpPr>
+        <a:xfrm>
+          <a:off x="0" y="0"/>
+          <a:ext cx="0" cy="0"/>
+          <a:chOff x="0" y="0"/>
+          <a:chExt cx="0" cy="0"/>
+        </a:xfrm>
+      </p:grpSpPr>
+      <p:sp>
+        <p:nvSpPr>
+          <p:cNvPr id="4" name="Rectangle 3"/>
+          <p:cNvSpPr/>
+          <p:nvPr/>
+        </p:nvSpPr>
+        <p:spPr>
+          <a:xfrm>
+            <a:off x="0" y="0"/>
+            <a:ext cx="9144000" cy="6858000"/>
+          </a:xfrm>
+          <a:prstGeom prst="rect">
+            <a:avLst/>
+          </a:prstGeom>
+          <a:gradFill>
+            <a:gsLst>
+              <a:gs pos="23000">
+                <a:srgbClr val="000928"/>
+              </a:gs>
+              <a:gs pos="43000">
+                <a:srgbClr val="34598D"/>
+              </a:gs>
+              <a:gs pos="89000">
+                <a:srgbClr val="BDD8F3"/>
+              </a:gs>
+            </a:gsLst>
+            <a:lin ang="5400000" scaled="0"/>
+          </a:gradFill>
+          <a:ln>
+            <a:noFill/>
+          </a:ln>
+        </p:spPr>
+        <p:style>
+          <a:lnRef idx="2">
+            <a:schemeClr val="accent1">
+              <a:shade val="50000"/>
+            </a:schemeClr>
+          </a:lnRef>
+          <a:fillRef idx="1">
+            <a:schemeClr val="accent1"/>
+          </a:fillRef>
+          <a:effectRef idx="0">
+            <a:schemeClr val="accent1"/>
+          </a:effectRef>
+          <a:fontRef idx="minor">
+            <a:schemeClr val="lt1"/>
+          </a:fontRef>
+        </p:style>
+        <p:txBody>
+          <a:bodyPr rtlCol="0" anchor="ctr"/>
+          <a:lstStyle/>
+          <a:p>
+            <a:pPr algn="ctr"/>
+            <a:endParaRPr lang="en-US" dirty="0"/>
+          </a:p>
+        </p:txBody>
+      </p:sp>
+      <p:sp>
+        <p:nvSpPr>
           <p:cNvPr id="7" name="Rounded Rectangle 6"/>
           <p:cNvSpPr/>
           <p:nvPr/>
@@ -14767,7 +15991,7 @@
             <a:r>
               <a:rPr lang="en-US" sz="4000" b="1" dirty="0" smtClean="0">
                 <a:solidFill>
-                  <a:srgbClr val="3C8FED"/>
+                  <a:srgbClr val="92D050"/>
                 </a:solidFill>
                 <a:latin typeface="Segoe UI" panose="020B0502040204020203" pitchFamily="34" charset="0"/>
                 <a:cs typeface="Segoe UI" panose="020B0502040204020203" pitchFamily="34" charset="0"/>
@@ -14776,7 +16000,7 @@
             </a:r>
             <a:endParaRPr lang="en-US" sz="4000" b="1" dirty="0">
               <a:solidFill>
-                <a:srgbClr val="3C8FED"/>
+                <a:srgbClr val="92D050"/>
               </a:solidFill>
               <a:latin typeface="Segoe UI" panose="020B0502040204020203" pitchFamily="34" charset="0"/>
               <a:cs typeface="Segoe UI" panose="020B0502040204020203" pitchFamily="34" charset="0"/>
@@ -14809,7 +16033,7 @@
             <a:r>
               <a:rPr lang="en-US" sz="3600" dirty="0" smtClean="0">
                 <a:solidFill>
-                  <a:srgbClr val="92D050"/>
+                  <a:srgbClr val="00B0F0"/>
                 </a:solidFill>
               </a:rPr>
               <a:t>1. Sự ra đời của phần mềm</a:t>
@@ -14829,7 +16053,7 @@
             <a:r>
               <a:rPr lang="en-US" sz="3600" dirty="0" smtClean="0">
                 <a:solidFill>
-                  <a:srgbClr val="FFC000"/>
+                  <a:srgbClr val="00B0F0"/>
                 </a:solidFill>
               </a:rPr>
               <a:t>3. Các công nghệ áp dụng trong phần mềm</a:t>
@@ -14839,14 +16063,14 @@
             <a:r>
               <a:rPr lang="en-US" sz="3600" dirty="0" smtClean="0">
                 <a:solidFill>
-                  <a:srgbClr val="F5802D"/>
+                  <a:srgbClr val="00B0F0"/>
                 </a:solidFill>
               </a:rPr>
               <a:t>4. Chạy thử phần mềm</a:t>
             </a:r>
             <a:endParaRPr lang="en-US" sz="3600" dirty="0">
               <a:solidFill>
-                <a:srgbClr val="F5802D"/>
+                <a:srgbClr val="00B0F0"/>
               </a:solidFill>
             </a:endParaRPr>
           </a:p>
@@ -16275,7 +17499,7 @@
             <a:r>
               <a:rPr lang="en-US" sz="4000" b="1" dirty="0" smtClean="0">
                 <a:solidFill>
-                  <a:srgbClr val="3C8FED"/>
+                  <a:srgbClr val="92D050"/>
                 </a:solidFill>
                 <a:latin typeface="Segoe UI" panose="020B0502040204020203" pitchFamily="34" charset="0"/>
                 <a:cs typeface="Segoe UI" panose="020B0502040204020203" pitchFamily="34" charset="0"/>
@@ -16284,7 +17508,7 @@
             </a:r>
             <a:endParaRPr lang="en-US" sz="4000" b="1" dirty="0">
               <a:solidFill>
-                <a:srgbClr val="3C8FED"/>
+                <a:srgbClr val="92D050"/>
               </a:solidFill>
               <a:latin typeface="Segoe UI" panose="020B0502040204020203" pitchFamily="34" charset="0"/>
               <a:cs typeface="Segoe UI" panose="020B0502040204020203" pitchFamily="34" charset="0"/>
@@ -16409,7 +17633,7 @@
             <a:r>
               <a:rPr lang="en-US" sz="3600" dirty="0" smtClean="0">
                 <a:solidFill>
-                  <a:srgbClr val="92D050"/>
+                  <a:srgbClr val="00B0F0"/>
                 </a:solidFill>
               </a:rPr>
               <a:t>Yêu cầu từ ...</a:t>
@@ -16418,14 +17642,14 @@
           <a:p>
             <a:endParaRPr lang="en-US" sz="3600" dirty="0" smtClean="0">
               <a:solidFill>
-                <a:srgbClr val="92D050"/>
+                <a:srgbClr val="00B0F0"/>
               </a:solidFill>
             </a:endParaRPr>
           </a:p>
           <a:p>
             <a:endParaRPr lang="en-US" sz="3600" dirty="0" smtClean="0">
               <a:solidFill>
-                <a:srgbClr val="92D050"/>
+                <a:srgbClr val="00B0F0"/>
               </a:solidFill>
             </a:endParaRPr>
           </a:p>
@@ -16441,7 +17665,7 @@
             </a:r>
             <a:endParaRPr lang="en-US" sz="3600" dirty="0">
               <a:solidFill>
-                <a:srgbClr val="F5802D"/>
+                <a:srgbClr val="00B0F0"/>
               </a:solidFill>
             </a:endParaRPr>
           </a:p>
@@ -17702,7 +18926,7 @@
             <a:r>
               <a:rPr lang="en-US" sz="4000" b="1" dirty="0" smtClean="0">
                 <a:solidFill>
-                  <a:srgbClr val="3C8FED"/>
+                  <a:srgbClr val="92D050"/>
                 </a:solidFill>
                 <a:latin typeface="Segoe UI" panose="020B0502040204020203" pitchFamily="34" charset="0"/>
                 <a:cs typeface="Segoe UI" panose="020B0502040204020203" pitchFamily="34" charset="0"/>
@@ -17711,7 +18935,7 @@
             </a:r>
             <a:endParaRPr lang="en-US" sz="4000" b="1" dirty="0">
               <a:solidFill>
-                <a:srgbClr val="3C8FED"/>
+                <a:srgbClr val="92D050"/>
               </a:solidFill>
               <a:latin typeface="Segoe UI" panose="020B0502040204020203" pitchFamily="34" charset="0"/>
               <a:cs typeface="Segoe UI" panose="020B0502040204020203" pitchFamily="34" charset="0"/>
@@ -17744,7 +18968,7 @@
             <a:r>
               <a:rPr lang="en-US" sz="3600" dirty="0" smtClean="0">
                 <a:solidFill>
-                  <a:srgbClr val="92D050"/>
+                  <a:srgbClr val="00B0F0"/>
                 </a:solidFill>
               </a:rPr>
               <a:t>1. Chức năng nhập liệu</a:t>
@@ -17764,7 +18988,7 @@
             <a:r>
               <a:rPr lang="en-US" sz="3600" dirty="0" smtClean="0">
                 <a:solidFill>
-                  <a:srgbClr val="FFC000"/>
+                  <a:srgbClr val="00B0F0"/>
                 </a:solidFill>
               </a:rPr>
               <a:t>3. Chức năng thống kê, báo cáo</a:t>
@@ -17774,7 +18998,7 @@
             <a:r>
               <a:rPr lang="en-US" sz="3600" dirty="0" smtClean="0">
                 <a:solidFill>
-                  <a:srgbClr val="F5802D"/>
+                  <a:srgbClr val="00B0F0"/>
                 </a:solidFill>
               </a:rPr>
               <a:t>4. Chức năng tiện ích khác</a:t>
@@ -20673,7 +21897,7 @@
             <a:r>
               <a:rPr lang="en-US" sz="4000" b="1" dirty="0" smtClean="0">
                 <a:solidFill>
-                  <a:srgbClr val="00B0F0"/>
+                  <a:srgbClr val="92D050"/>
                 </a:solidFill>
                 <a:latin typeface="Segoe UI" panose="020B0502040204020203" pitchFamily="34" charset="0"/>
                 <a:cs typeface="Segoe UI" panose="020B0502040204020203" pitchFamily="34" charset="0"/>
@@ -20682,7 +21906,7 @@
             </a:r>
             <a:endParaRPr lang="en-US" sz="4000" b="1" dirty="0">
               <a:solidFill>
-                <a:srgbClr val="00B0F0"/>
+                <a:srgbClr val="92D050"/>
               </a:solidFill>
               <a:latin typeface="Segoe UI" panose="020B0502040204020203" pitchFamily="34" charset="0"/>
               <a:cs typeface="Segoe UI" panose="020B0502040204020203" pitchFamily="34" charset="0"/>
@@ -20887,7 +22111,7 @@
             <a:r>
               <a:rPr lang="en-US" sz="3600" dirty="0" smtClean="0">
                 <a:solidFill>
-                  <a:srgbClr val="92D050"/>
+                  <a:srgbClr val="00B0F0"/>
                 </a:solidFill>
               </a:rPr>
               <a:t>Phân quyền</a:t>
@@ -20909,14 +22133,14 @@
             <a:r>
               <a:rPr lang="en-US" sz="3600" dirty="0" smtClean="0">
                 <a:solidFill>
-                  <a:srgbClr val="FFC000"/>
+                  <a:srgbClr val="00B0F0"/>
                 </a:solidFill>
               </a:rPr>
               <a:t>Cấu hình</a:t>
             </a:r>
             <a:endParaRPr lang="en-US" sz="3600" dirty="0">
               <a:solidFill>
-                <a:srgbClr val="F5802D"/>
+                <a:srgbClr val="00B0F0"/>
               </a:solidFill>
             </a:endParaRPr>
           </a:p>
@@ -22323,7 +23547,7 @@
             <a:r>
               <a:rPr lang="en-US" sz="4000" b="1" dirty="0" smtClean="0">
                 <a:solidFill>
-                  <a:srgbClr val="FFC000"/>
+                  <a:srgbClr val="92D050"/>
                 </a:solidFill>
                 <a:latin typeface="Segoe UI" panose="020B0502040204020203" pitchFamily="34" charset="0"/>
                 <a:cs typeface="Segoe UI" panose="020B0502040204020203" pitchFamily="34" charset="0"/>
@@ -22332,7 +23556,7 @@
             </a:r>
             <a:endParaRPr lang="en-US" sz="4000" b="1" dirty="0">
               <a:solidFill>
-                <a:srgbClr val="FFC000"/>
+                <a:srgbClr val="92D050"/>
               </a:solidFill>
               <a:latin typeface="Segoe UI" panose="020B0502040204020203" pitchFamily="34" charset="0"/>
               <a:cs typeface="Segoe UI" panose="020B0502040204020203" pitchFamily="34" charset="0"/>
@@ -22537,7 +23761,7 @@
             <a:r>
               <a:rPr lang="en-US" sz="3600" dirty="0" smtClean="0">
                 <a:solidFill>
-                  <a:srgbClr val="92D050"/>
+                  <a:srgbClr val="00B0F0"/>
                 </a:solidFill>
               </a:rPr>
               <a:t>Thống kê </a:t>
@@ -22545,16 +23769,11 @@
             <a:r>
               <a:rPr lang="en-US" sz="3600" dirty="0" smtClean="0">
                 <a:solidFill>
-                  <a:srgbClr val="92D050"/>
+                  <a:srgbClr val="00B0F0"/>
                 </a:solidFill>
               </a:rPr>
               <a:t>phòng</a:t>
             </a:r>
-            <a:endParaRPr lang="en-US" sz="3600" dirty="0" smtClean="0">
-              <a:solidFill>
-                <a:srgbClr val="92D050"/>
-              </a:solidFill>
-            </a:endParaRPr>
           </a:p>
           <a:p>
             <a:pPr algn="ctr"/>
@@ -22572,38 +23791,14 @@
             <a:r>
               <a:rPr lang="en-US" sz="3600" dirty="0" smtClean="0">
                 <a:solidFill>
-                  <a:srgbClr val="FFC000"/>
+                  <a:srgbClr val="00B0F0"/>
                 </a:solidFill>
               </a:rPr>
-              <a:t>Thống </a:t>
-            </a:r>
-            <a:r>
-              <a:rPr lang="en-US" sz="3600" smtClean="0">
-                <a:solidFill>
-                  <a:srgbClr val="FFC000"/>
-                </a:solidFill>
-              </a:rPr>
-              <a:t>kê </a:t>
-            </a:r>
-            <a:r>
-              <a:rPr lang="en-US" sz="3600" smtClean="0">
-                <a:solidFill>
-                  <a:srgbClr val="FFC000"/>
-                </a:solidFill>
-              </a:rPr>
-              <a:t>tài </a:t>
-            </a:r>
-            <a:r>
-              <a:rPr lang="en-US" sz="3600" dirty="0" smtClean="0">
-                <a:solidFill>
-                  <a:srgbClr val="FFC000"/>
-                </a:solidFill>
-              </a:rPr>
-              <a:t>sản</a:t>
+              <a:t>Thống kê tài sản</a:t>
             </a:r>
             <a:endParaRPr lang="en-US" sz="3600" dirty="0">
               <a:solidFill>
-                <a:srgbClr val="F5802D"/>
+                <a:srgbClr val="00B0F0"/>
               </a:solidFill>
             </a:endParaRPr>
           </a:p>
@@ -24010,7 +25205,7 @@
             <a:r>
               <a:rPr lang="en-US" sz="4000" b="1" dirty="0" smtClean="0">
                 <a:solidFill>
-                  <a:srgbClr val="F5802D"/>
+                  <a:srgbClr val="92D050"/>
                 </a:solidFill>
                 <a:latin typeface="Segoe UI" panose="020B0502040204020203" pitchFamily="34" charset="0"/>
                 <a:cs typeface="Segoe UI" panose="020B0502040204020203" pitchFamily="34" charset="0"/>
@@ -24019,7 +25214,7 @@
             </a:r>
             <a:endParaRPr lang="en-US" sz="4000" b="1" dirty="0">
               <a:solidFill>
-                <a:srgbClr val="F5802D"/>
+                <a:srgbClr val="92D050"/>
               </a:solidFill>
               <a:latin typeface="Segoe UI" panose="020B0502040204020203" pitchFamily="34" charset="0"/>
               <a:cs typeface="Segoe UI" panose="020B0502040204020203" pitchFamily="34" charset="0"/>
@@ -24138,7 +25333,7 @@
             <a:r>
               <a:rPr lang="en-US" sz="3600" dirty="0" smtClean="0">
                 <a:solidFill>
-                  <a:srgbClr val="92D050"/>
+                  <a:srgbClr val="00B0F0"/>
                 </a:solidFill>
               </a:rPr>
               <a:t>Nhập liệu từ tập tin</a:t>
@@ -24160,14 +25355,14 @@
             <a:r>
               <a:rPr lang="en-US" sz="3600" dirty="0" smtClean="0">
                 <a:solidFill>
-                  <a:srgbClr val="FFC000"/>
+                  <a:srgbClr val="00B0F0"/>
                 </a:solidFill>
               </a:rPr>
               <a:t>Làm việc ngoại tuyến</a:t>
             </a:r>
             <a:endParaRPr lang="en-US" sz="3600" dirty="0">
               <a:solidFill>
-                <a:srgbClr val="F5802D"/>
+                <a:srgbClr val="00B0F0"/>
               </a:solidFill>
             </a:endParaRPr>
           </a:p>
@@ -25527,7 +26722,7 @@
             <a:r>
               <a:rPr lang="en-US" sz="4000" b="1" dirty="0" smtClean="0">
                 <a:solidFill>
-                  <a:srgbClr val="3C8FED"/>
+                  <a:srgbClr val="92D050"/>
                 </a:solidFill>
                 <a:latin typeface="Segoe UI" panose="020B0502040204020203" pitchFamily="34" charset="0"/>
                 <a:cs typeface="Segoe UI" panose="020B0502040204020203" pitchFamily="34" charset="0"/>
@@ -25536,7 +26731,7 @@
             </a:r>
             <a:endParaRPr lang="en-US" sz="4000" b="1" dirty="0">
               <a:solidFill>
-                <a:srgbClr val="3C8FED"/>
+                <a:srgbClr val="92D050"/>
               </a:solidFill>
               <a:latin typeface="Segoe UI" panose="020B0502040204020203" pitchFamily="34" charset="0"/>
               <a:cs typeface="Segoe UI" panose="020B0502040204020203" pitchFamily="34" charset="0"/>
@@ -25569,7 +26764,7 @@
             <a:r>
               <a:rPr lang="en-US" sz="3600" dirty="0" smtClean="0">
                 <a:solidFill>
-                  <a:srgbClr val="92D050"/>
+                  <a:srgbClr val="00B0F0"/>
                 </a:solidFill>
               </a:rPr>
               <a:t>1. Framework</a:t>
@@ -25589,7 +26784,7 @@
             <a:r>
               <a:rPr lang="en-US" sz="3600" dirty="0" smtClean="0">
                 <a:solidFill>
-                  <a:srgbClr val="FFC000"/>
+                  <a:srgbClr val="00B0F0"/>
                 </a:solidFill>
               </a:rPr>
               <a:t>3. DevExpress</a:t>
@@ -25599,7 +26794,7 @@
             <a:r>
               <a:rPr lang="en-US" sz="3600" dirty="0" smtClean="0">
                 <a:solidFill>
-                  <a:srgbClr val="F5802D"/>
+                  <a:srgbClr val="00B0F0"/>
                 </a:solidFill>
               </a:rPr>
               <a:t>4. </a:t>
@@ -25607,7 +26802,7 @@
             <a:r>
               <a:rPr lang="en-US" sz="3600" dirty="0">
                 <a:solidFill>
-                  <a:srgbClr val="F5802D"/>
+                  <a:srgbClr val="00B0F0"/>
                 </a:solidFill>
               </a:rPr>
               <a:t>Responsive Web </a:t>
@@ -25615,7 +26810,7 @@
             <a:r>
               <a:rPr lang="en-US" sz="3600" dirty="0" smtClean="0">
                 <a:solidFill>
-                  <a:srgbClr val="F5802D"/>
+                  <a:srgbClr val="00B0F0"/>
                 </a:solidFill>
               </a:rPr>
               <a:t>Design</a:t>
@@ -25625,14 +26820,14 @@
             <a:r>
               <a:rPr lang="en-US" sz="3600" dirty="0" smtClean="0">
                 <a:solidFill>
-                  <a:srgbClr val="00B050"/>
+                  <a:srgbClr val="00B0F0"/>
                 </a:solidFill>
               </a:rPr>
               <a:t>5. Các mô hình</a:t>
             </a:r>
             <a:endParaRPr lang="en-US" sz="3600" dirty="0">
               <a:solidFill>
-                <a:srgbClr val="00B050"/>
+                <a:srgbClr val="00B0F0"/>
               </a:solidFill>
             </a:endParaRPr>
           </a:p>
@@ -25740,7 +26935,7 @@
         </p:nvSpPr>
         <p:spPr>
           <a:xfrm>
-            <a:off x="2286000" y="2573129"/>
+            <a:off x="2275840" y="2573129"/>
             <a:ext cx="5941250" cy="474871"/>
           </a:xfrm>
           <a:prstGeom prst="rect">
@@ -25786,7 +26981,7 @@
         </p:nvSpPr>
         <p:spPr>
           <a:xfrm>
-            <a:off x="2308670" y="3106529"/>
+            <a:off x="2298510" y="3106529"/>
             <a:ext cx="5931090" cy="474871"/>
           </a:xfrm>
           <a:prstGeom prst="rect">
@@ -25832,7 +27027,7 @@
         </p:nvSpPr>
         <p:spPr>
           <a:xfrm>
-            <a:off x="2296160" y="3639929"/>
+            <a:off x="2286000" y="3639929"/>
             <a:ext cx="5943600" cy="474871"/>
           </a:xfrm>
           <a:prstGeom prst="rect">
@@ -25878,7 +27073,7 @@
         </p:nvSpPr>
         <p:spPr>
           <a:xfrm>
-            <a:off x="2286000" y="1981200"/>
+            <a:off x="2275840" y="1981200"/>
             <a:ext cx="5941250" cy="474871"/>
           </a:xfrm>
           <a:prstGeom prst="rect">
@@ -25924,7 +27119,7 @@
         </p:nvSpPr>
         <p:spPr>
           <a:xfrm>
-            <a:off x="2296160" y="4172192"/>
+            <a:off x="2286000" y="4172192"/>
             <a:ext cx="5943600" cy="474871"/>
           </a:xfrm>
           <a:prstGeom prst="rect">

</xml_diff>